<commit_message>
adding new slides for milestone 2
</commit_message>
<xml_diff>
--- a/docs/minipresentation/Team 9 Mini-Presentation.pptx
+++ b/docs/minipresentation/Team 9 Mini-Presentation.pptx
@@ -13,21 +13,22 @@
     <p:sldId id="258" r:id="rId8"/>
     <p:sldId id="259" r:id="rId9"/>
     <p:sldId id="260" r:id="rId10"/>
+    <p:sldId id="261" r:id="rId11"/>
   </p:sldIdLst>
   <p:sldSz cy="5143500" cx="9144000"/>
   <p:notesSz cx="6858000" cy="9144000"/>
   <p:embeddedFontLst>
     <p:embeddedFont>
       <p:font typeface="Amatic SC"/>
-      <p:regular r:id="rId11"/>
-      <p:bold r:id="rId12"/>
+      <p:regular r:id="rId12"/>
+      <p:bold r:id="rId13"/>
     </p:embeddedFont>
     <p:embeddedFont>
       <p:font typeface="Source Code Pro"/>
-      <p:regular r:id="rId13"/>
-      <p:bold r:id="rId14"/>
-      <p:italic r:id="rId15"/>
-      <p:boldItalic r:id="rId16"/>
+      <p:regular r:id="rId14"/>
+      <p:bold r:id="rId15"/>
+      <p:italic r:id="rId16"/>
+      <p:boldItalic r:id="rId17"/>
     </p:embeddedFont>
   </p:embeddedFontLst>
   <p:defaultTextStyle>
@@ -1155,6 +1156,105 @@
       <p:sp>
         <p:nvSpPr>
           <p:cNvPr id="78" name="Google Shape;78;g2957ead568e_0_74:notes"/>
+          <p:cNvSpPr txBox="1"/>
+          <p:nvPr>
+            <p:ph idx="1" type="body"/>
+          </p:nvPr>
+        </p:nvSpPr>
+        <p:spPr>
+          <a:xfrm>
+            <a:off x="685800" y="4343400"/>
+            <a:ext cx="5486400" cy="4114800"/>
+          </a:xfrm>
+          <a:prstGeom prst="rect">
+            <a:avLst/>
+          </a:prstGeom>
+        </p:spPr>
+        <p:txBody>
+          <a:bodyPr anchorCtr="0" anchor="t" bIns="91425" lIns="91425" spcFirstLastPara="1" rIns="91425" wrap="square" tIns="91425">
+            <a:noAutofit/>
+          </a:bodyPr>
+          <a:lstStyle/>
+          <a:p>
+            <a:pPr indent="0" lvl="0" marL="0" rtl="0" algn="l">
+              <a:spcBef>
+                <a:spcPts val="0"/>
+              </a:spcBef>
+              <a:spcAft>
+                <a:spcPts val="0"/>
+              </a:spcAft>
+              <a:buNone/>
+            </a:pPr>
+            <a:r>
+              <a:t/>
+            </a:r>
+            <a:endParaRPr/>
+          </a:p>
+        </p:txBody>
+      </p:sp>
+    </p:spTree>
+  </p:cSld>
+  <p:clrMapOvr>
+    <a:masterClrMapping/>
+  </p:clrMapOvr>
+</p:notes>
+</file>
+
+<file path=ppt/notesSlides/notesSlide6.xml><?xml version="1.0" encoding="utf-8"?>
+<p:notes xmlns:a="http://schemas.openxmlformats.org/drawingml/2006/main" xmlns:r="http://schemas.openxmlformats.org/officeDocument/2006/relationships" xmlns:mc="http://schemas.openxmlformats.org/markup-compatibility/2006" xmlns:mv="urn:schemas-microsoft-com:mac:vml" xmlns:p="http://schemas.openxmlformats.org/presentationml/2006/main" xmlns:c="http://schemas.openxmlformats.org/drawingml/2006/chart" xmlns:dgm="http://schemas.openxmlformats.org/drawingml/2006/diagram" xmlns:o="urn:schemas-microsoft-com:office:office" xmlns:v="urn:schemas-microsoft-com:vml" xmlns:pvml="urn:schemas-microsoft-com:office:powerpoint" xmlns:com="http://schemas.openxmlformats.org/drawingml/2006/compatibility" xmlns:p14="http://schemas.microsoft.com/office/powerpoint/2010/main" xmlns:p15="http://schemas.microsoft.com/office/powerpoint/2012/main" xmlns:ahyp="http://schemas.microsoft.com/office/drawing/2018/hyperlinkcolor" showMasterPhAnim="0" showMasterSp="0">
+  <p:cSld>
+    <p:spTree>
+      <p:nvGrpSpPr>
+        <p:cNvPr id="82" name="Shape 82"/>
+        <p:cNvGrpSpPr/>
+        <p:nvPr/>
+      </p:nvGrpSpPr>
+      <p:grpSpPr>
+        <a:xfrm>
+          <a:off x="0" y="0"/>
+          <a:ext cx="0" cy="0"/>
+          <a:chOff x="0" y="0"/>
+          <a:chExt cx="0" cy="0"/>
+        </a:xfrm>
+      </p:grpSpPr>
+      <p:sp>
+        <p:nvSpPr>
+          <p:cNvPr id="83" name="Google Shape;83;g2958f94cc7b_0_0:notes"/>
+          <p:cNvSpPr/>
+          <p:nvPr>
+            <p:ph idx="2" type="sldImg"/>
+          </p:nvPr>
+        </p:nvSpPr>
+        <p:spPr>
+          <a:xfrm>
+            <a:off x="381300" y="685800"/>
+            <a:ext cx="6096000" cy="3429000"/>
+          </a:xfrm>
+          <a:custGeom>
+            <a:rect b="b" l="l" r="r" t="t"/>
+            <a:pathLst>
+              <a:path extrusionOk="0" h="120000" w="120000">
+                <a:moveTo>
+                  <a:pt x="0" y="0"/>
+                </a:moveTo>
+                <a:lnTo>
+                  <a:pt x="120000" y="0"/>
+                </a:lnTo>
+                <a:lnTo>
+                  <a:pt x="120000" y="120000"/>
+                </a:lnTo>
+                <a:lnTo>
+                  <a:pt x="0" y="120000"/>
+                </a:lnTo>
+                <a:close/>
+              </a:path>
+            </a:pathLst>
+          </a:custGeom>
+        </p:spPr>
+      </p:sp>
+      <p:sp>
+        <p:nvSpPr>
+          <p:cNvPr id="84" name="Google Shape;84;g2958f94cc7b_0_0:notes"/>
           <p:cNvSpPr txBox="1"/>
           <p:nvPr>
             <p:ph idx="1" type="body"/>
@@ -6735,7 +6835,7 @@
             </a:pPr>
             <a:r>
               <a:rPr lang="en"/>
-              <a:t>Obscurus.me is a web application facilitates easy and user-friendly transfer of videos with confidence that the video will remain secure.  </a:t>
+              <a:t>Obscurus.me is a web application that facilitates easy and user-friendly transfer of videos with confidence that the video and any information within will remain secure.  </a:t>
             </a:r>
             <a:endParaRPr/>
           </a:p>
@@ -6820,7 +6920,7 @@
             </a:pPr>
             <a:r>
               <a:rPr lang="en"/>
-              <a:t>Upload video </a:t>
+              <a:t>Upload videos </a:t>
             </a:r>
             <a:endParaRPr/>
           </a:p>
@@ -6927,18 +7027,19 @@
         </p:spPr>
         <p:txBody>
           <a:bodyPr anchorCtr="0" anchor="t" bIns="91425" lIns="91425" spcFirstLastPara="1" rIns="91425" wrap="square" tIns="91425">
-            <a:normAutofit lnSpcReduction="20000"/>
+            <a:normAutofit/>
           </a:bodyPr>
           <a:lstStyle/>
           <a:p>
-            <a:pPr indent="0" lvl="0" marL="0" rtl="0" algn="l">
-              <a:spcBef>
-                <a:spcPts val="0"/>
-              </a:spcBef>
-              <a:spcAft>
-                <a:spcPts val="0"/>
-              </a:spcAft>
-              <a:buNone/>
+            <a:pPr indent="-342900" lvl="0" marL="457200" rtl="0" algn="l">
+              <a:spcBef>
+                <a:spcPts val="0"/>
+              </a:spcBef>
+              <a:spcAft>
+                <a:spcPts val="0"/>
+              </a:spcAft>
+              <a:buSzPts val="1800"/>
+              <a:buChar char="●"/>
             </a:pPr>
             <a:r>
               <a:rPr lang="en"/>
@@ -6947,30 +7048,32 @@
             <a:endParaRPr/>
           </a:p>
           <a:p>
-            <a:pPr indent="0" lvl="0" marL="0" rtl="0" algn="l">
-              <a:spcBef>
-                <a:spcPts val="1200"/>
-              </a:spcBef>
-              <a:spcAft>
-                <a:spcPts val="0"/>
-              </a:spcAft>
-              <a:buNone/>
+            <a:pPr indent="-317500" lvl="1" marL="914400" rtl="0" algn="l">
+              <a:spcBef>
+                <a:spcPts val="0"/>
+              </a:spcBef>
+              <a:spcAft>
+                <a:spcPts val="0"/>
+              </a:spcAft>
+              <a:buSzPts val="1400"/>
+              <a:buChar char="○"/>
             </a:pPr>
             <a:r>
               <a:rPr lang="en"/>
-              <a:t>	Front/Back-end development &amp; Troubleshooting</a:t>
+              <a:t>Front/Back-end development &amp; Troubleshooting</a:t>
             </a:r>
             <a:endParaRPr/>
           </a:p>
           <a:p>
-            <a:pPr indent="0" lvl="0" marL="0" rtl="0" algn="l">
-              <a:spcBef>
-                <a:spcPts val="1200"/>
-              </a:spcBef>
-              <a:spcAft>
-                <a:spcPts val="0"/>
-              </a:spcAft>
-              <a:buNone/>
+            <a:pPr indent="-342900" lvl="0" marL="457200" rtl="0" algn="l">
+              <a:spcBef>
+                <a:spcPts val="0"/>
+              </a:spcBef>
+              <a:spcAft>
+                <a:spcPts val="0"/>
+              </a:spcAft>
+              <a:buSzPts val="1800"/>
+              <a:buChar char="●"/>
             </a:pPr>
             <a:r>
               <a:rPr lang="en"/>
@@ -6979,30 +7082,32 @@
             <a:endParaRPr/>
           </a:p>
           <a:p>
-            <a:pPr indent="0" lvl="0" marL="0" rtl="0" algn="l">
-              <a:spcBef>
-                <a:spcPts val="1200"/>
-              </a:spcBef>
-              <a:spcAft>
-                <a:spcPts val="0"/>
-              </a:spcAft>
-              <a:buNone/>
+            <a:pPr indent="-317500" lvl="1" marL="914400" rtl="0" algn="l">
+              <a:spcBef>
+                <a:spcPts val="0"/>
+              </a:spcBef>
+              <a:spcAft>
+                <a:spcPts val="0"/>
+              </a:spcAft>
+              <a:buSzPts val="1400"/>
+              <a:buChar char="○"/>
             </a:pPr>
             <a:r>
               <a:rPr lang="en"/>
-              <a:t>	Technical Lead &amp; Front/Back-end Development</a:t>
+              <a:t>Technical Lead &amp; Front/Back-end Development</a:t>
             </a:r>
             <a:endParaRPr/>
           </a:p>
           <a:p>
-            <a:pPr indent="0" lvl="0" marL="0" rtl="0" algn="l">
-              <a:spcBef>
-                <a:spcPts val="1200"/>
-              </a:spcBef>
-              <a:spcAft>
-                <a:spcPts val="0"/>
-              </a:spcAft>
-              <a:buNone/>
+            <a:pPr indent="-342900" lvl="0" marL="457200" rtl="0" algn="l">
+              <a:spcBef>
+                <a:spcPts val="0"/>
+              </a:spcBef>
+              <a:spcAft>
+                <a:spcPts val="0"/>
+              </a:spcAft>
+              <a:buSzPts val="1800"/>
+              <a:buChar char="●"/>
             </a:pPr>
             <a:r>
               <a:rPr lang="en"/>
@@ -7011,30 +7116,32 @@
             <a:endParaRPr/>
           </a:p>
           <a:p>
-            <a:pPr indent="0" lvl="0" marL="0" rtl="0" algn="l">
-              <a:spcBef>
-                <a:spcPts val="1200"/>
-              </a:spcBef>
-              <a:spcAft>
-                <a:spcPts val="0"/>
-              </a:spcAft>
-              <a:buNone/>
+            <a:pPr indent="-317500" lvl="1" marL="914400" rtl="0" algn="l">
+              <a:spcBef>
+                <a:spcPts val="0"/>
+              </a:spcBef>
+              <a:spcAft>
+                <a:spcPts val="0"/>
+              </a:spcAft>
+              <a:buSzPts val="1400"/>
+              <a:buChar char="○"/>
             </a:pPr>
             <a:r>
               <a:rPr lang="en"/>
-              <a:t>	Front/Back-end Development &amp; Documentation</a:t>
+              <a:t>Front/Back-end Development &amp; Documentation</a:t>
             </a:r>
             <a:endParaRPr/>
           </a:p>
           <a:p>
-            <a:pPr indent="0" lvl="0" marL="0" rtl="0" algn="l">
-              <a:spcBef>
-                <a:spcPts val="1200"/>
-              </a:spcBef>
-              <a:spcAft>
-                <a:spcPts val="0"/>
-              </a:spcAft>
-              <a:buNone/>
+            <a:pPr indent="-342900" lvl="0" marL="457200" rtl="0" algn="l">
+              <a:spcBef>
+                <a:spcPts val="0"/>
+              </a:spcBef>
+              <a:spcAft>
+                <a:spcPts val="0"/>
+              </a:spcAft>
+              <a:buSzPts val="1800"/>
+              <a:buChar char="●"/>
             </a:pPr>
             <a:r>
               <a:rPr lang="en"/>
@@ -7043,19 +7150,16 @@
             <a:endParaRPr/>
           </a:p>
           <a:p>
-            <a:pPr indent="0" lvl="0" marL="0" rtl="0" algn="l">
-              <a:spcBef>
-                <a:spcPts val="1200"/>
-              </a:spcBef>
-              <a:spcAft>
-                <a:spcPts val="1200"/>
-              </a:spcAft>
-              <a:buNone/>
+            <a:pPr indent="-317500" lvl="1" marL="914400" rtl="0" algn="l">
+              <a:spcBef>
+                <a:spcPts val="0"/>
+              </a:spcBef>
+              <a:spcAft>
+                <a:spcPts val="0"/>
+              </a:spcAft>
+              <a:buSzPts val="1400"/>
+              <a:buChar char="○"/>
             </a:pPr>
-            <a:r>
-              <a:rPr lang="en"/>
-              <a:t>	</a:t>
-            </a:r>
             <a:r>
               <a:rPr lang="en"/>
               <a:t>Project Management &amp; </a:t>
@@ -7295,7 +7399,7 @@
             </a:r>
             <a:r>
               <a:rPr lang="en"/>
-              <a:t>; AWS CodeBuild to test backend code; and AWS CodePipeline to trigger, build, and deploy.</a:t>
+              <a:t>; AWS CodeBuild to test backend code; and AWS CodePipeline to trigger tests, build, and deploy code.</a:t>
             </a:r>
             <a:endParaRPr/>
           </a:p>
@@ -7311,6 +7415,196 @@
             </a:pPr>
             <a:r>
               <a:t/>
+            </a:r>
+            <a:endParaRPr/>
+          </a:p>
+        </p:txBody>
+      </p:sp>
+    </p:spTree>
+  </p:cSld>
+  <p:clrMapOvr>
+    <a:masterClrMapping/>
+  </p:clrMapOvr>
+</p:sld>
+</file>
+
+<file path=ppt/slides/slide6.xml><?xml version="1.0" encoding="utf-8"?>
+<p:sld xmlns:a="http://schemas.openxmlformats.org/drawingml/2006/main" xmlns:r="http://schemas.openxmlformats.org/officeDocument/2006/relationships" xmlns:mc="http://schemas.openxmlformats.org/markup-compatibility/2006" xmlns:mv="urn:schemas-microsoft-com:mac:vml" xmlns:p="http://schemas.openxmlformats.org/presentationml/2006/main" xmlns:c="http://schemas.openxmlformats.org/drawingml/2006/chart" xmlns:dgm="http://schemas.openxmlformats.org/drawingml/2006/diagram" xmlns:o="urn:schemas-microsoft-com:office:office" xmlns:v="urn:schemas-microsoft-com:vml" xmlns:pvml="urn:schemas-microsoft-com:office:powerpoint" xmlns:com="http://schemas.openxmlformats.org/drawingml/2006/compatibility" xmlns:p14="http://schemas.microsoft.com/office/powerpoint/2010/main" xmlns:p15="http://schemas.microsoft.com/office/powerpoint/2012/main" xmlns:ahyp="http://schemas.microsoft.com/office/drawing/2018/hyperlinkcolor">
+  <p:cSld>
+    <p:spTree>
+      <p:nvGrpSpPr>
+        <p:cNvPr id="85" name="Shape 85"/>
+        <p:cNvGrpSpPr/>
+        <p:nvPr/>
+      </p:nvGrpSpPr>
+      <p:grpSpPr>
+        <a:xfrm>
+          <a:off x="0" y="0"/>
+          <a:ext cx="0" cy="0"/>
+          <a:chOff x="0" y="0"/>
+          <a:chExt cx="0" cy="0"/>
+        </a:xfrm>
+      </p:grpSpPr>
+      <p:sp>
+        <p:nvSpPr>
+          <p:cNvPr id="86" name="Google Shape;86;p18"/>
+          <p:cNvSpPr txBox="1"/>
+          <p:nvPr>
+            <p:ph type="title"/>
+          </p:nvPr>
+        </p:nvSpPr>
+        <p:spPr>
+          <a:xfrm>
+            <a:off x="311700" y="292850"/>
+            <a:ext cx="8520600" cy="801000"/>
+          </a:xfrm>
+          <a:prstGeom prst="rect">
+            <a:avLst/>
+          </a:prstGeom>
+        </p:spPr>
+        <p:txBody>
+          <a:bodyPr anchorCtr="0" anchor="t" bIns="91425" lIns="91425" spcFirstLastPara="1" rIns="91425" wrap="square" tIns="91425">
+            <a:normAutofit fontScale="90000"/>
+          </a:bodyPr>
+          <a:lstStyle/>
+          <a:p>
+            <a:pPr indent="0" lvl="0" marL="0" rtl="0" algn="l">
+              <a:spcBef>
+                <a:spcPts val="0"/>
+              </a:spcBef>
+              <a:spcAft>
+                <a:spcPts val="0"/>
+              </a:spcAft>
+              <a:buNone/>
+            </a:pPr>
+            <a:r>
+              <a:rPr lang="en"/>
+              <a:t>Problems</a:t>
+            </a:r>
+            <a:endParaRPr/>
+          </a:p>
+        </p:txBody>
+      </p:sp>
+      <p:sp>
+        <p:nvSpPr>
+          <p:cNvPr id="87" name="Google Shape;87;p18"/>
+          <p:cNvSpPr txBox="1"/>
+          <p:nvPr>
+            <p:ph idx="1" type="body"/>
+          </p:nvPr>
+        </p:nvSpPr>
+        <p:spPr>
+          <a:xfrm>
+            <a:off x="311700" y="1228675"/>
+            <a:ext cx="8520600" cy="3340200"/>
+          </a:xfrm>
+          <a:prstGeom prst="rect">
+            <a:avLst/>
+          </a:prstGeom>
+        </p:spPr>
+        <p:txBody>
+          <a:bodyPr anchorCtr="0" anchor="t" bIns="91425" lIns="91425" spcFirstLastPara="1" rIns="91425" wrap="square" tIns="91425">
+            <a:normAutofit/>
+          </a:bodyPr>
+          <a:lstStyle/>
+          <a:p>
+            <a:pPr indent="0" lvl="0" marL="0" rtl="0" algn="l">
+              <a:spcBef>
+                <a:spcPts val="0"/>
+              </a:spcBef>
+              <a:spcAft>
+                <a:spcPts val="0"/>
+              </a:spcAft>
+              <a:buNone/>
+            </a:pPr>
+            <a:r>
+              <a:rPr lang="en"/>
+              <a:t>Problems Experienced:</a:t>
+            </a:r>
+            <a:endParaRPr/>
+          </a:p>
+          <a:p>
+            <a:pPr indent="-342900" lvl="0" marL="457200" rtl="0" algn="l">
+              <a:spcBef>
+                <a:spcPts val="1200"/>
+              </a:spcBef>
+              <a:spcAft>
+                <a:spcPts val="0"/>
+              </a:spcAft>
+              <a:buSzPts val="1800"/>
+              <a:buChar char="●"/>
+            </a:pPr>
+            <a:r>
+              <a:rPr lang="en"/>
+              <a:t>Developing a cohesive testing </a:t>
+            </a:r>
+            <a:r>
+              <a:rPr lang="en"/>
+              <a:t>build.</a:t>
+            </a:r>
+            <a:endParaRPr/>
+          </a:p>
+          <a:p>
+            <a:pPr indent="0" lvl="0" marL="0" rtl="0" algn="l">
+              <a:spcBef>
+                <a:spcPts val="1200"/>
+              </a:spcBef>
+              <a:spcAft>
+                <a:spcPts val="0"/>
+              </a:spcAft>
+              <a:buNone/>
+            </a:pPr>
+            <a:r>
+              <a:t/>
+            </a:r>
+            <a:endParaRPr/>
+          </a:p>
+          <a:p>
+            <a:pPr indent="-342900" lvl="0" marL="457200" rtl="0" algn="l">
+              <a:spcBef>
+                <a:spcPts val="1200"/>
+              </a:spcBef>
+              <a:spcAft>
+                <a:spcPts val="0"/>
+              </a:spcAft>
+              <a:buSzPts val="1800"/>
+              <a:buChar char="●"/>
+            </a:pPr>
+            <a:r>
+              <a:rPr lang="en"/>
+              <a:t>Maintaining a consistent design language across multiple pages and platforms.  </a:t>
+            </a:r>
+            <a:endParaRPr/>
+          </a:p>
+          <a:p>
+            <a:pPr indent="0" lvl="0" marL="0" rtl="0" algn="l">
+              <a:spcBef>
+                <a:spcPts val="1200"/>
+              </a:spcBef>
+              <a:spcAft>
+                <a:spcPts val="0"/>
+              </a:spcAft>
+              <a:buNone/>
+            </a:pPr>
+            <a:r>
+              <a:t/>
+            </a:r>
+            <a:endParaRPr/>
+          </a:p>
+          <a:p>
+            <a:pPr indent="-342900" lvl="0" marL="457200" rtl="0" algn="l">
+              <a:spcBef>
+                <a:spcPts val="1200"/>
+              </a:spcBef>
+              <a:spcAft>
+                <a:spcPts val="0"/>
+              </a:spcAft>
+              <a:buSzPts val="1800"/>
+              <a:buChar char="●"/>
+            </a:pPr>
+            <a:r>
+              <a:rPr lang="en"/>
+              <a:t>AWS authorisation errors.</a:t>
             </a:r>
             <a:endParaRPr/>
           </a:p>

</xml_diff>